<commit_message>
add new icon and update ui designer
</commit_message>
<xml_diff>
--- a/doc/ui_design.pptx
+++ b/doc/ui_design.pptx
@@ -6,6 +6,7 @@
   </p:sldMasterIdLst>
   <p:sldIdLst>
     <p:sldId id="256" r:id="rId3"/>
+    <p:sldId id="257" r:id="rId4"/>
   </p:sldIdLst>
   <p:sldSz cx="12192000" cy="6858000"/>
   <p:notesSz cx="6858000" cy="9144000"/>
@@ -3760,6 +3761,87 @@
 </p:sld>
 </file>
 
+<file path=ppt/slides/slide2.xml><?xml version="1.0" encoding="utf-8"?>
+<p:sld xmlns:a="http://schemas.openxmlformats.org/drawingml/2006/main" xmlns:r="http://schemas.openxmlformats.org/officeDocument/2006/relationships" xmlns:p="http://schemas.openxmlformats.org/presentationml/2006/main">
+  <p:cSld>
+    <p:spTree>
+      <p:nvGrpSpPr>
+        <p:cNvPr id="1" name=""/>
+        <p:cNvGrpSpPr/>
+        <p:nvPr/>
+      </p:nvGrpSpPr>
+      <p:grpSpPr/>
+      <p:pic>
+        <p:nvPicPr>
+          <p:cNvPr id="4" name="图片 3"/>
+          <p:cNvPicPr>
+            <a:picLocks noChangeAspect="1"/>
+          </p:cNvPicPr>
+          <p:nvPr>
+            <p:custDataLst>
+              <p:tags r:id="rId1"/>
+            </p:custDataLst>
+          </p:nvPr>
+        </p:nvPicPr>
+        <p:blipFill>
+          <a:blip r:embed="rId2"/>
+          <a:stretch>
+            <a:fillRect/>
+          </a:stretch>
+        </p:blipFill>
+        <p:spPr>
+          <a:xfrm>
+            <a:off x="3017520" y="143510"/>
+            <a:ext cx="6355080" cy="6570980"/>
+          </a:xfrm>
+          <a:prstGeom prst="rect">
+            <a:avLst/>
+          </a:prstGeom>
+        </p:spPr>
+      </p:pic>
+      <p:sp>
+        <p:nvSpPr>
+          <p:cNvPr id="5" name="文本框 4"/>
+          <p:cNvSpPr txBox="1"/>
+          <p:nvPr/>
+        </p:nvSpPr>
+        <p:spPr>
+          <a:xfrm>
+            <a:off x="1243965" y="520065"/>
+            <a:ext cx="1247140" cy="368300"/>
+          </a:xfrm>
+          <a:prstGeom prst="rect">
+            <a:avLst/>
+          </a:prstGeom>
+          <a:noFill/>
+        </p:spPr>
+        <p:txBody>
+          <a:bodyPr wrap="none" rtlCol="0">
+            <a:spAutoFit/>
+          </a:bodyPr>
+          <a:p>
+            <a:r>
+              <a:rPr lang="en-US" altLang="zh-CN"/>
+              <a:t>2022-04-21</a:t>
+            </a:r>
+            <a:endParaRPr lang="en-US" altLang="zh-CN"/>
+          </a:p>
+        </p:txBody>
+      </p:sp>
+    </p:spTree>
+  </p:cSld>
+  <p:clrMapOvr>
+    <a:masterClrMapping/>
+  </p:clrMapOvr>
+</p:sld>
+</file>
+
+<file path=ppt/tags/tag1.xml><?xml version="1.0" encoding="utf-8"?>
+<p:tagLst xmlns:p="http://schemas.openxmlformats.org/presentationml/2006/main">
+  <p:tag name="KSO_WM_UNIT_PLACING_PICTURE_USER_VIEWPORT" val="{&quot;height&quot;:13230,&quot;width&quot;:12795}"/>
+</p:tagLst>
+</file>
+
 <file path=ppt/theme/theme1.xml><?xml version="1.0" encoding="utf-8"?>
 <a:theme xmlns:a="http://schemas.openxmlformats.org/drawingml/2006/main" name="Office 主题">
   <a:themeElements>

</xml_diff>

<commit_message>
solver the bug of update the selected pkg-name
</commit_message>
<xml_diff>
--- a/doc/ui_design.pptx
+++ b/doc/ui_design.pptx
@@ -7,6 +7,7 @@
   <p:sldIdLst>
     <p:sldId id="256" r:id="rId3"/>
     <p:sldId id="257" r:id="rId4"/>
+    <p:sldId id="258" r:id="rId5"/>
   </p:sldIdLst>
   <p:sldSz cx="12192000" cy="6858000"/>
   <p:notesSz cx="6858000" cy="9144000"/>
@@ -3836,6 +3837,857 @@
 </p:sld>
 </file>
 
+<file path=ppt/slides/slide3.xml><?xml version="1.0" encoding="utf-8"?>
+<p:sld xmlns:a="http://schemas.openxmlformats.org/drawingml/2006/main" xmlns:r="http://schemas.openxmlformats.org/officeDocument/2006/relationships" xmlns:p="http://schemas.openxmlformats.org/presentationml/2006/main">
+  <p:cSld>
+    <p:spTree>
+      <p:nvGrpSpPr>
+        <p:cNvPr id="1" name=""/>
+        <p:cNvGrpSpPr/>
+        <p:nvPr/>
+      </p:nvGrpSpPr>
+      <p:grpSpPr/>
+      <p:pic>
+        <p:nvPicPr>
+          <p:cNvPr id="4" name="图片 3" descr="UI"/>
+          <p:cNvPicPr>
+            <a:picLocks noChangeAspect="1"/>
+          </p:cNvPicPr>
+          <p:nvPr/>
+        </p:nvPicPr>
+        <p:blipFill>
+          <a:blip r:embed="rId1"/>
+          <a:stretch>
+            <a:fillRect/>
+          </a:stretch>
+        </p:blipFill>
+        <p:spPr>
+          <a:xfrm>
+            <a:off x="2357120" y="0"/>
+            <a:ext cx="6680200" cy="6858000"/>
+          </a:xfrm>
+          <a:prstGeom prst="rect">
+            <a:avLst/>
+          </a:prstGeom>
+        </p:spPr>
+      </p:pic>
+      <p:sp>
+        <p:nvSpPr>
+          <p:cNvPr id="5" name="线形标注 1 4"/>
+          <p:cNvSpPr/>
+          <p:nvPr/>
+        </p:nvSpPr>
+        <p:spPr>
+          <a:xfrm>
+            <a:off x="4281170" y="77470"/>
+            <a:ext cx="1485900" cy="252095"/>
+          </a:xfrm>
+          <a:prstGeom prst="borderCallout1">
+            <a:avLst>
+              <a:gd name="adj1" fmla="val 15365"/>
+              <a:gd name="adj2" fmla="val 103418"/>
+              <a:gd name="adj3" fmla="val 119647"/>
+              <a:gd name="adj4" fmla="val 139487"/>
+            </a:avLst>
+          </a:prstGeom>
+          <a:ln>
+            <a:solidFill>
+              <a:schemeClr val="accent2"/>
+            </a:solidFill>
+          </a:ln>
+        </p:spPr>
+        <p:style>
+          <a:lnRef idx="2">
+            <a:schemeClr val="accent2"/>
+          </a:lnRef>
+          <a:fillRef idx="1">
+            <a:schemeClr val="lt1"/>
+          </a:fillRef>
+          <a:effectRef idx="0">
+            <a:schemeClr val="accent2"/>
+          </a:effectRef>
+          <a:fontRef idx="minor">
+            <a:schemeClr val="dk1"/>
+          </a:fontRef>
+        </p:style>
+        <p:txBody>
+          <a:bodyPr rtlCol="0" anchor="ctr"/>
+          <a:p>
+            <a:pPr algn="ctr"/>
+            <a:r>
+              <a:rPr lang="zh-CN" altLang="en-US" sz="1000">
+                <a:solidFill>
+                  <a:srgbClr val="0070C0"/>
+                </a:solidFill>
+              </a:rPr>
+              <a:t>点击之后跳到安装界面</a:t>
+            </a:r>
+            <a:endParaRPr lang="zh-CN" altLang="en-US" sz="1000">
+              <a:solidFill>
+                <a:srgbClr val="0070C0"/>
+              </a:solidFill>
+            </a:endParaRPr>
+          </a:p>
+        </p:txBody>
+      </p:sp>
+      <p:sp>
+        <p:nvSpPr>
+          <p:cNvPr id="6" name="线形标注 1 5"/>
+          <p:cNvSpPr/>
+          <p:nvPr/>
+        </p:nvSpPr>
+        <p:spPr>
+          <a:xfrm>
+            <a:off x="1136650" y="720725"/>
+            <a:ext cx="4429760" cy="252095"/>
+          </a:xfrm>
+          <a:prstGeom prst="borderCallout1">
+            <a:avLst>
+              <a:gd name="adj1" fmla="val 15365"/>
+              <a:gd name="adj2" fmla="val 103418"/>
+              <a:gd name="adj3" fmla="val -18136"/>
+              <a:gd name="adj4" fmla="val 112315"/>
+            </a:avLst>
+          </a:prstGeom>
+          <a:ln>
+            <a:solidFill>
+              <a:schemeClr val="accent2"/>
+            </a:solidFill>
+          </a:ln>
+        </p:spPr>
+        <p:style>
+          <a:lnRef idx="2">
+            <a:schemeClr val="accent2"/>
+          </a:lnRef>
+          <a:fillRef idx="1">
+            <a:schemeClr val="lt1"/>
+          </a:fillRef>
+          <a:effectRef idx="0">
+            <a:schemeClr val="accent2"/>
+          </a:effectRef>
+          <a:fontRef idx="minor">
+            <a:schemeClr val="dk1"/>
+          </a:fontRef>
+        </p:style>
+        <p:txBody>
+          <a:bodyPr rtlCol="0" anchor="ctr"/>
+          <a:p>
+            <a:pPr algn="ctr"/>
+            <a:r>
+              <a:rPr lang="zh-CN" altLang="en-US" sz="1000">
+                <a:solidFill>
+                  <a:srgbClr val="0070C0"/>
+                </a:solidFill>
+              </a:rPr>
+              <a:t>强烈建议第一步操作：自动检测电脑已安装</a:t>
+            </a:r>
+            <a:r>
+              <a:rPr lang="en-US" altLang="zh-CN" sz="1000">
+                <a:solidFill>
+                  <a:srgbClr val="0070C0"/>
+                </a:solidFill>
+              </a:rPr>
+              <a:t>julia</a:t>
+            </a:r>
+            <a:r>
+              <a:rPr lang="zh-CN" altLang="en-US" sz="1000">
+                <a:solidFill>
+                  <a:srgbClr val="0070C0"/>
+                </a:solidFill>
+              </a:rPr>
+              <a:t>的路径，并自动填入下方</a:t>
+            </a:r>
+            <a:endParaRPr lang="zh-CN" altLang="en-US" sz="1000">
+              <a:solidFill>
+                <a:srgbClr val="0070C0"/>
+              </a:solidFill>
+            </a:endParaRPr>
+          </a:p>
+        </p:txBody>
+      </p:sp>
+      <p:sp>
+        <p:nvSpPr>
+          <p:cNvPr id="7" name="线形标注 1 6"/>
+          <p:cNvSpPr/>
+          <p:nvPr/>
+        </p:nvSpPr>
+        <p:spPr>
+          <a:xfrm>
+            <a:off x="9635490" y="77470"/>
+            <a:ext cx="1485900" cy="252095"/>
+          </a:xfrm>
+          <a:prstGeom prst="borderCallout1">
+            <a:avLst>
+              <a:gd name="adj1" fmla="val 22418"/>
+              <a:gd name="adj2" fmla="val -1282"/>
+              <a:gd name="adj3" fmla="val 95465"/>
+              <a:gd name="adj4" fmla="val -62307"/>
+            </a:avLst>
+          </a:prstGeom>
+          <a:ln>
+            <a:solidFill>
+              <a:schemeClr val="accent2"/>
+            </a:solidFill>
+          </a:ln>
+        </p:spPr>
+        <p:style>
+          <a:lnRef idx="2">
+            <a:schemeClr val="accent2"/>
+          </a:lnRef>
+          <a:fillRef idx="1">
+            <a:schemeClr val="lt1"/>
+          </a:fillRef>
+          <a:effectRef idx="0">
+            <a:schemeClr val="accent2"/>
+          </a:effectRef>
+          <a:fontRef idx="minor">
+            <a:schemeClr val="dk1"/>
+          </a:fontRef>
+        </p:style>
+        <p:txBody>
+          <a:bodyPr rtlCol="0" anchor="ctr"/>
+          <a:p>
+            <a:pPr algn="ctr"/>
+            <a:r>
+              <a:rPr lang="zh-CN" altLang="en-US" sz="1000">
+                <a:solidFill>
+                  <a:srgbClr val="0070C0"/>
+                </a:solidFill>
+              </a:rPr>
+              <a:t>点击之后跳到</a:t>
+            </a:r>
+            <a:r>
+              <a:rPr lang="en-US" altLang="zh-CN" sz="1000">
+                <a:solidFill>
+                  <a:srgbClr val="0070C0"/>
+                </a:solidFill>
+              </a:rPr>
+              <a:t>juliahub</a:t>
+            </a:r>
+            <a:endParaRPr lang="en-US" altLang="zh-CN" sz="1000">
+              <a:solidFill>
+                <a:srgbClr val="0070C0"/>
+              </a:solidFill>
+            </a:endParaRPr>
+          </a:p>
+        </p:txBody>
+      </p:sp>
+      <p:sp>
+        <p:nvSpPr>
+          <p:cNvPr id="8" name="线形标注 1 7"/>
+          <p:cNvSpPr/>
+          <p:nvPr/>
+        </p:nvSpPr>
+        <p:spPr>
+          <a:xfrm>
+            <a:off x="9826625" y="381635"/>
+            <a:ext cx="1485900" cy="252095"/>
+          </a:xfrm>
+          <a:prstGeom prst="borderCallout1">
+            <a:avLst>
+              <a:gd name="adj1" fmla="val 22418"/>
+              <a:gd name="adj2" fmla="val -1282"/>
+              <a:gd name="adj3" fmla="val 95465"/>
+              <a:gd name="adj4" fmla="val -62307"/>
+            </a:avLst>
+          </a:prstGeom>
+          <a:ln>
+            <a:solidFill>
+              <a:schemeClr val="accent2"/>
+            </a:solidFill>
+          </a:ln>
+        </p:spPr>
+        <p:style>
+          <a:lnRef idx="2">
+            <a:schemeClr val="accent2"/>
+          </a:lnRef>
+          <a:fillRef idx="1">
+            <a:schemeClr val="lt1"/>
+          </a:fillRef>
+          <a:effectRef idx="0">
+            <a:schemeClr val="accent2"/>
+          </a:effectRef>
+          <a:fontRef idx="minor">
+            <a:schemeClr val="dk1"/>
+          </a:fontRef>
+        </p:style>
+        <p:txBody>
+          <a:bodyPr rtlCol="0" anchor="ctr"/>
+          <a:p>
+            <a:pPr algn="ctr"/>
+            <a:r>
+              <a:rPr lang="zh-CN" altLang="en-US" sz="1000">
+                <a:solidFill>
+                  <a:srgbClr val="0070C0"/>
+                </a:solidFill>
+              </a:rPr>
+              <a:t>点击之后跳到英文社区</a:t>
+            </a:r>
+            <a:endParaRPr lang="zh-CN" altLang="en-US" sz="1000">
+              <a:solidFill>
+                <a:srgbClr val="0070C0"/>
+              </a:solidFill>
+            </a:endParaRPr>
+          </a:p>
+        </p:txBody>
+      </p:sp>
+      <p:sp>
+        <p:nvSpPr>
+          <p:cNvPr id="9" name="线形标注 1 8"/>
+          <p:cNvSpPr/>
+          <p:nvPr/>
+        </p:nvSpPr>
+        <p:spPr>
+          <a:xfrm>
+            <a:off x="9904730" y="720725"/>
+            <a:ext cx="1485900" cy="252095"/>
+          </a:xfrm>
+          <a:prstGeom prst="borderCallout1">
+            <a:avLst>
+              <a:gd name="adj1" fmla="val 22418"/>
+              <a:gd name="adj2" fmla="val -1282"/>
+              <a:gd name="adj3" fmla="val 29974"/>
+              <a:gd name="adj4" fmla="val -65811"/>
+            </a:avLst>
+          </a:prstGeom>
+          <a:ln>
+            <a:solidFill>
+              <a:schemeClr val="accent2"/>
+            </a:solidFill>
+          </a:ln>
+        </p:spPr>
+        <p:style>
+          <a:lnRef idx="2">
+            <a:schemeClr val="accent2"/>
+          </a:lnRef>
+          <a:fillRef idx="1">
+            <a:schemeClr val="lt1"/>
+          </a:fillRef>
+          <a:effectRef idx="0">
+            <a:schemeClr val="accent2"/>
+          </a:effectRef>
+          <a:fontRef idx="minor">
+            <a:schemeClr val="dk1"/>
+          </a:fontRef>
+        </p:style>
+        <p:txBody>
+          <a:bodyPr rtlCol="0" anchor="ctr"/>
+          <a:p>
+            <a:pPr algn="ctr"/>
+            <a:r>
+              <a:rPr lang="zh-CN" altLang="en-US" sz="1000">
+                <a:solidFill>
+                  <a:srgbClr val="0070C0"/>
+                </a:solidFill>
+              </a:rPr>
+              <a:t>点击之后跳到中文社区</a:t>
+            </a:r>
+            <a:endParaRPr lang="zh-CN" altLang="en-US" sz="1000">
+              <a:solidFill>
+                <a:srgbClr val="0070C0"/>
+              </a:solidFill>
+            </a:endParaRPr>
+          </a:p>
+        </p:txBody>
+      </p:sp>
+      <p:sp>
+        <p:nvSpPr>
+          <p:cNvPr id="10" name="线形标注 1 9"/>
+          <p:cNvSpPr/>
+          <p:nvPr/>
+        </p:nvSpPr>
+        <p:spPr>
+          <a:xfrm>
+            <a:off x="9904730" y="1146810"/>
+            <a:ext cx="1833245" cy="1085215"/>
+          </a:xfrm>
+          <a:prstGeom prst="borderCallout1">
+            <a:avLst>
+              <a:gd name="adj1" fmla="val 22418"/>
+              <a:gd name="adj2" fmla="val -1282"/>
+              <a:gd name="adj3" fmla="val 14285"/>
+              <a:gd name="adj4" fmla="val -64253"/>
+            </a:avLst>
+          </a:prstGeom>
+          <a:ln>
+            <a:solidFill>
+              <a:schemeClr val="accent2"/>
+            </a:solidFill>
+          </a:ln>
+        </p:spPr>
+        <p:style>
+          <a:lnRef idx="2">
+            <a:schemeClr val="accent2"/>
+          </a:lnRef>
+          <a:fillRef idx="1">
+            <a:schemeClr val="lt1"/>
+          </a:fillRef>
+          <a:effectRef idx="0">
+            <a:schemeClr val="accent2"/>
+          </a:effectRef>
+          <a:fontRef idx="minor">
+            <a:schemeClr val="dk1"/>
+          </a:fontRef>
+        </p:style>
+        <p:txBody>
+          <a:bodyPr rtlCol="0" anchor="ctr"/>
+          <a:p>
+            <a:pPr algn="ctr"/>
+            <a:r>
+              <a:rPr lang="zh-CN" altLang="en-US" sz="1000">
+                <a:solidFill>
+                  <a:srgbClr val="0070C0"/>
+                </a:solidFill>
+              </a:rPr>
+              <a:t>如果电脑已安装</a:t>
+            </a:r>
+            <a:r>
+              <a:rPr lang="en-US" altLang="zh-CN" sz="1000">
+                <a:solidFill>
+                  <a:srgbClr val="0070C0"/>
+                </a:solidFill>
+              </a:rPr>
+              <a:t>Julia</a:t>
+            </a:r>
+            <a:r>
+              <a:rPr lang="zh-CN" altLang="en-US" sz="1000">
+                <a:solidFill>
+                  <a:srgbClr val="0070C0"/>
+                </a:solidFill>
+              </a:rPr>
+              <a:t>，但是并没有写入</a:t>
+            </a:r>
+            <a:r>
+              <a:rPr lang="en-US" altLang="zh-CN" sz="1000">
+                <a:solidFill>
+                  <a:srgbClr val="0070C0"/>
+                </a:solidFill>
+              </a:rPr>
+              <a:t>Path</a:t>
+            </a:r>
+            <a:r>
+              <a:rPr lang="zh-CN" altLang="en-US" sz="1000">
+                <a:solidFill>
+                  <a:srgbClr val="0070C0"/>
+                </a:solidFill>
+              </a:rPr>
+              <a:t>环境变量中，可以在这里面手动输入或点击按照找到</a:t>
+            </a:r>
+            <a:r>
+              <a:rPr lang="en-US" altLang="zh-CN" sz="1000">
+                <a:solidFill>
+                  <a:srgbClr val="0070C0"/>
+                </a:solidFill>
+              </a:rPr>
+              <a:t>julia.exe</a:t>
+            </a:r>
+            <a:r>
+              <a:rPr lang="zh-CN" altLang="en-US" sz="1000">
+                <a:solidFill>
+                  <a:srgbClr val="0070C0"/>
+                </a:solidFill>
+              </a:rPr>
+              <a:t>。手动输入时，需要注意</a:t>
+            </a:r>
+            <a:r>
+              <a:rPr lang="en-US" altLang="zh-CN" sz="1000">
+                <a:solidFill>
+                  <a:srgbClr val="0070C0"/>
+                </a:solidFill>
+              </a:rPr>
+              <a:t>windows</a:t>
+            </a:r>
+            <a:r>
+              <a:rPr lang="zh-CN" altLang="en-US" sz="1000">
+                <a:solidFill>
+                  <a:srgbClr val="0070C0"/>
+                </a:solidFill>
+              </a:rPr>
+              <a:t>下路径分隔符需要：</a:t>
+            </a:r>
+            <a:r>
+              <a:rPr lang="en-US" altLang="zh-CN" sz="1000">
+                <a:solidFill>
+                  <a:srgbClr val="0070C0"/>
+                </a:solidFill>
+              </a:rPr>
+              <a:t>\\</a:t>
+            </a:r>
+            <a:endParaRPr lang="en-US" altLang="zh-CN" sz="1000">
+              <a:solidFill>
+                <a:srgbClr val="0070C0"/>
+              </a:solidFill>
+            </a:endParaRPr>
+          </a:p>
+        </p:txBody>
+      </p:sp>
+      <p:sp>
+        <p:nvSpPr>
+          <p:cNvPr id="11" name="线形标注 1 10"/>
+          <p:cNvSpPr/>
+          <p:nvPr/>
+        </p:nvSpPr>
+        <p:spPr>
+          <a:xfrm>
+            <a:off x="9731375" y="3310890"/>
+            <a:ext cx="1833245" cy="660400"/>
+          </a:xfrm>
+          <a:prstGeom prst="borderCallout1">
+            <a:avLst>
+              <a:gd name="adj1" fmla="val 22418"/>
+              <a:gd name="adj2" fmla="val -1282"/>
+              <a:gd name="adj3" fmla="val -8133"/>
+              <a:gd name="adj4" fmla="val -86075"/>
+            </a:avLst>
+          </a:prstGeom>
+          <a:ln>
+            <a:solidFill>
+              <a:schemeClr val="accent2"/>
+            </a:solidFill>
+          </a:ln>
+        </p:spPr>
+        <p:style>
+          <a:lnRef idx="2">
+            <a:schemeClr val="accent2"/>
+          </a:lnRef>
+          <a:fillRef idx="1">
+            <a:schemeClr val="lt1"/>
+          </a:fillRef>
+          <a:effectRef idx="0">
+            <a:schemeClr val="accent2"/>
+          </a:effectRef>
+          <a:fontRef idx="minor">
+            <a:schemeClr val="dk1"/>
+          </a:fontRef>
+        </p:style>
+        <p:txBody>
+          <a:bodyPr rtlCol="0" anchor="ctr"/>
+          <a:p>
+            <a:pPr algn="ctr"/>
+            <a:r>
+              <a:rPr lang="zh-CN" altLang="en-US" sz="1000">
+                <a:solidFill>
+                  <a:srgbClr val="0070C0"/>
+                </a:solidFill>
+              </a:rPr>
+              <a:t>当检测到</a:t>
+            </a:r>
+            <a:r>
+              <a:rPr lang="en-US" altLang="zh-CN" sz="1000">
+                <a:solidFill>
+                  <a:srgbClr val="0070C0"/>
+                </a:solidFill>
+              </a:rPr>
+              <a:t>julia</a:t>
+            </a:r>
+            <a:r>
+              <a:rPr lang="zh-CN" altLang="en-US" sz="1000">
+                <a:solidFill>
+                  <a:srgbClr val="0070C0"/>
+                </a:solidFill>
+              </a:rPr>
+              <a:t>时，这里面的表格会自动显示系统已安装的</a:t>
+            </a:r>
+            <a:r>
+              <a:rPr lang="en-US" altLang="zh-CN" sz="1000">
+                <a:solidFill>
+                  <a:srgbClr val="0070C0"/>
+                </a:solidFill>
+              </a:rPr>
+              <a:t>julia package</a:t>
+            </a:r>
+            <a:r>
+              <a:rPr lang="zh-CN" altLang="en-US" sz="1000">
+                <a:solidFill>
+                  <a:srgbClr val="0070C0"/>
+                </a:solidFill>
+              </a:rPr>
+              <a:t>相关的信息。当前不支持</a:t>
+            </a:r>
+            <a:r>
+              <a:rPr lang="en-US" altLang="zh-CN" sz="1000">
+                <a:solidFill>
+                  <a:srgbClr val="0070C0"/>
+                </a:solidFill>
+              </a:rPr>
+              <a:t>Latest Version</a:t>
+            </a:r>
+            <a:r>
+              <a:rPr lang="zh-CN" altLang="en-US" sz="1000">
+                <a:solidFill>
+                  <a:srgbClr val="0070C0"/>
+                </a:solidFill>
+              </a:rPr>
+              <a:t>。</a:t>
+            </a:r>
+            <a:endParaRPr lang="zh-CN" altLang="en-US" sz="1000">
+              <a:solidFill>
+                <a:srgbClr val="0070C0"/>
+              </a:solidFill>
+            </a:endParaRPr>
+          </a:p>
+        </p:txBody>
+      </p:sp>
+      <p:sp>
+        <p:nvSpPr>
+          <p:cNvPr id="12" name="线形标注 1 11"/>
+          <p:cNvSpPr/>
+          <p:nvPr/>
+        </p:nvSpPr>
+        <p:spPr>
+          <a:xfrm>
+            <a:off x="107950" y="1511300"/>
+            <a:ext cx="1651000" cy="572135"/>
+          </a:xfrm>
+          <a:prstGeom prst="borderCallout1">
+            <a:avLst>
+              <a:gd name="adj1" fmla="val 15365"/>
+              <a:gd name="adj2" fmla="val 103418"/>
+              <a:gd name="adj3" fmla="val 4772"/>
+              <a:gd name="adj4" fmla="val 149769"/>
+            </a:avLst>
+          </a:prstGeom>
+          <a:ln>
+            <a:solidFill>
+              <a:schemeClr val="accent2"/>
+            </a:solidFill>
+          </a:ln>
+        </p:spPr>
+        <p:style>
+          <a:lnRef idx="2">
+            <a:schemeClr val="accent2"/>
+          </a:lnRef>
+          <a:fillRef idx="1">
+            <a:schemeClr val="lt1"/>
+          </a:fillRef>
+          <a:effectRef idx="0">
+            <a:schemeClr val="accent2"/>
+          </a:effectRef>
+          <a:fontRef idx="minor">
+            <a:schemeClr val="dk1"/>
+          </a:fontRef>
+        </p:style>
+        <p:txBody>
+          <a:bodyPr rtlCol="0" anchor="ctr"/>
+          <a:p>
+            <a:pPr algn="ctr"/>
+            <a:r>
+              <a:rPr lang="zh-CN" altLang="en-US" sz="1000">
+                <a:solidFill>
+                  <a:srgbClr val="0070C0"/>
+                </a:solidFill>
+              </a:rPr>
+              <a:t>点击之后打开界面：输入安装的包的名字。当前不支持安装某一特定版本</a:t>
+            </a:r>
+            <a:endParaRPr lang="zh-CN" altLang="en-US" sz="1000">
+              <a:solidFill>
+                <a:srgbClr val="0070C0"/>
+              </a:solidFill>
+            </a:endParaRPr>
+          </a:p>
+        </p:txBody>
+      </p:sp>
+      <p:sp>
+        <p:nvSpPr>
+          <p:cNvPr id="13" name="线形标注 1 12"/>
+          <p:cNvSpPr/>
+          <p:nvPr/>
+        </p:nvSpPr>
+        <p:spPr>
+          <a:xfrm>
+            <a:off x="107950" y="2371725"/>
+            <a:ext cx="1651000" cy="572135"/>
+          </a:xfrm>
+          <a:prstGeom prst="borderCallout1">
+            <a:avLst>
+              <a:gd name="adj1" fmla="val 15365"/>
+              <a:gd name="adj2" fmla="val 103418"/>
+              <a:gd name="adj3" fmla="val -125860"/>
+              <a:gd name="adj4" fmla="val 175576"/>
+            </a:avLst>
+          </a:prstGeom>
+          <a:ln>
+            <a:solidFill>
+              <a:schemeClr val="accent2"/>
+            </a:solidFill>
+          </a:ln>
+        </p:spPr>
+        <p:style>
+          <a:lnRef idx="2">
+            <a:schemeClr val="accent2"/>
+          </a:lnRef>
+          <a:fillRef idx="1">
+            <a:schemeClr val="lt1"/>
+          </a:fillRef>
+          <a:effectRef idx="0">
+            <a:schemeClr val="accent2"/>
+          </a:effectRef>
+          <a:fontRef idx="minor">
+            <a:schemeClr val="dk1"/>
+          </a:fontRef>
+        </p:style>
+        <p:txBody>
+          <a:bodyPr rtlCol="0" anchor="ctr"/>
+          <a:p>
+            <a:pPr algn="ctr"/>
+            <a:r>
+              <a:rPr lang="zh-CN" altLang="en-US" sz="1000">
+                <a:solidFill>
+                  <a:srgbClr val="0070C0"/>
+                </a:solidFill>
+              </a:rPr>
+              <a:t>首先在下方的表格中选择某个包，点击些按扭后会删除</a:t>
+            </a:r>
+            <a:r>
+              <a:rPr lang="en-US" altLang="zh-CN" sz="1000">
+                <a:solidFill>
+                  <a:srgbClr val="0070C0"/>
+                </a:solidFill>
+              </a:rPr>
+              <a:t>/</a:t>
+            </a:r>
+            <a:r>
+              <a:rPr lang="zh-CN" altLang="en-US" sz="1000">
+                <a:solidFill>
+                  <a:srgbClr val="0070C0"/>
+                </a:solidFill>
+              </a:rPr>
+              <a:t>卸载选择的包</a:t>
+            </a:r>
+            <a:endParaRPr lang="zh-CN" altLang="en-US" sz="1000">
+              <a:solidFill>
+                <a:srgbClr val="0070C0"/>
+              </a:solidFill>
+            </a:endParaRPr>
+          </a:p>
+        </p:txBody>
+      </p:sp>
+      <p:sp>
+        <p:nvSpPr>
+          <p:cNvPr id="14" name="线形标注 1 13"/>
+          <p:cNvSpPr/>
+          <p:nvPr/>
+        </p:nvSpPr>
+        <p:spPr>
+          <a:xfrm>
+            <a:off x="107950" y="3223260"/>
+            <a:ext cx="1651000" cy="572135"/>
+          </a:xfrm>
+          <a:prstGeom prst="borderCallout1">
+            <a:avLst>
+              <a:gd name="adj1" fmla="val 15365"/>
+              <a:gd name="adj2" fmla="val 103418"/>
+              <a:gd name="adj3" fmla="val -276248"/>
+              <a:gd name="adj4" fmla="val 202961"/>
+            </a:avLst>
+          </a:prstGeom>
+          <a:ln>
+            <a:solidFill>
+              <a:schemeClr val="accent2"/>
+            </a:solidFill>
+          </a:ln>
+        </p:spPr>
+        <p:style>
+          <a:lnRef idx="2">
+            <a:schemeClr val="accent2"/>
+          </a:lnRef>
+          <a:fillRef idx="1">
+            <a:schemeClr val="lt1"/>
+          </a:fillRef>
+          <a:effectRef idx="0">
+            <a:schemeClr val="accent2"/>
+          </a:effectRef>
+          <a:fontRef idx="minor">
+            <a:schemeClr val="dk1"/>
+          </a:fontRef>
+        </p:style>
+        <p:txBody>
+          <a:bodyPr rtlCol="0" anchor="ctr"/>
+          <a:p>
+            <a:pPr algn="ctr"/>
+            <a:r>
+              <a:rPr lang="zh-CN" altLang="en-US" sz="1000">
+                <a:solidFill>
+                  <a:srgbClr val="0070C0"/>
+                </a:solidFill>
+              </a:rPr>
+              <a:t>首先在下方的表格中选择某个包，点击些按扭后会升级选择的包</a:t>
+            </a:r>
+            <a:endParaRPr lang="zh-CN" altLang="en-US" sz="1000">
+              <a:solidFill>
+                <a:srgbClr val="0070C0"/>
+              </a:solidFill>
+            </a:endParaRPr>
+          </a:p>
+        </p:txBody>
+      </p:sp>
+      <p:sp>
+        <p:nvSpPr>
+          <p:cNvPr id="15" name="线形标注 1 14"/>
+          <p:cNvSpPr/>
+          <p:nvPr/>
+        </p:nvSpPr>
+        <p:spPr>
+          <a:xfrm>
+            <a:off x="107950" y="4126865"/>
+            <a:ext cx="1651000" cy="572135"/>
+          </a:xfrm>
+          <a:prstGeom prst="borderCallout1">
+            <a:avLst>
+              <a:gd name="adj1" fmla="val 15365"/>
+              <a:gd name="adj2" fmla="val 103418"/>
+              <a:gd name="adj3" fmla="val -435849"/>
+              <a:gd name="adj4" fmla="val 229807"/>
+            </a:avLst>
+          </a:prstGeom>
+          <a:ln>
+            <a:solidFill>
+              <a:schemeClr val="accent2"/>
+            </a:solidFill>
+          </a:ln>
+        </p:spPr>
+        <p:style>
+          <a:lnRef idx="2">
+            <a:schemeClr val="accent2"/>
+          </a:lnRef>
+          <a:fillRef idx="1">
+            <a:schemeClr val="lt1"/>
+          </a:fillRef>
+          <a:effectRef idx="0">
+            <a:schemeClr val="accent2"/>
+          </a:effectRef>
+          <a:fontRef idx="minor">
+            <a:schemeClr val="dk1"/>
+          </a:fontRef>
+        </p:style>
+        <p:txBody>
+          <a:bodyPr rtlCol="0" anchor="ctr"/>
+          <a:p>
+            <a:pPr algn="ctr"/>
+            <a:r>
+              <a:rPr lang="zh-CN" altLang="en-US" sz="1000">
+                <a:solidFill>
+                  <a:srgbClr val="0070C0"/>
+                </a:solidFill>
+              </a:rPr>
+              <a:t>升级所有的已安装的包</a:t>
+            </a:r>
+            <a:endParaRPr lang="zh-CN" altLang="en-US" sz="1000">
+              <a:solidFill>
+                <a:srgbClr val="0070C0"/>
+              </a:solidFill>
+            </a:endParaRPr>
+          </a:p>
+        </p:txBody>
+      </p:sp>
+    </p:spTree>
+  </p:cSld>
+  <p:clrMapOvr>
+    <a:masterClrMapping/>
+  </p:clrMapOvr>
+</p:sld>
+</file>
+
 <file path=ppt/tags/tag1.xml><?xml version="1.0" encoding="utf-8"?>
 <p:tagLst xmlns:p="http://schemas.openxmlformats.org/presentationml/2006/main">
   <p:tag name="KSO_WM_UNIT_PLACING_PICTURE_USER_VIEWPORT" val="{&quot;height&quot;:13230,&quot;width&quot;:12795}"/>

</xml_diff>